<commit_message>
PP presentation: Binding, Input binding
</commit_message>
<xml_diff>
--- a/power point presentation/DAPR.pptx
+++ b/power point presentation/DAPR.pptx
@@ -5,7 +5,7 @@
     <p:sldMasterId id="2147483658" r:id="rId1"/>
   </p:sldMasterIdLst>
   <p:notesMasterIdLst>
-    <p:notesMasterId r:id="rId24"/>
+    <p:notesMasterId r:id="rId26"/>
   </p:notesMasterIdLst>
   <p:sldIdLst>
     <p:sldId id="256" r:id="rId2"/>
@@ -24,27 +24,29 @@
     <p:sldId id="305" r:id="rId15"/>
     <p:sldId id="307" r:id="rId16"/>
     <p:sldId id="311" r:id="rId17"/>
-    <p:sldId id="310" r:id="rId18"/>
-    <p:sldId id="308" r:id="rId19"/>
-    <p:sldId id="309" r:id="rId20"/>
-    <p:sldId id="312" r:id="rId21"/>
-    <p:sldId id="313" r:id="rId22"/>
-    <p:sldId id="314" r:id="rId23"/>
+    <p:sldId id="315" r:id="rId18"/>
+    <p:sldId id="310" r:id="rId19"/>
+    <p:sldId id="316" r:id="rId20"/>
+    <p:sldId id="308" r:id="rId21"/>
+    <p:sldId id="309" r:id="rId22"/>
+    <p:sldId id="312" r:id="rId23"/>
+    <p:sldId id="313" r:id="rId24"/>
+    <p:sldId id="314" r:id="rId25"/>
   </p:sldIdLst>
   <p:sldSz cx="9144000" cy="5143500" type="screen16x9"/>
   <p:notesSz cx="6858000" cy="9144000"/>
   <p:embeddedFontLst>
     <p:embeddedFont>
       <p:font typeface="Roboto Slab" panose="020B0604020202020204" charset="0"/>
-      <p:regular r:id="rId25"/>
-      <p:bold r:id="rId26"/>
+      <p:regular r:id="rId27"/>
+      <p:bold r:id="rId28"/>
     </p:embeddedFont>
     <p:embeddedFont>
       <p:font typeface="Source Sans Pro" panose="020B0604020202020204" charset="0"/>
-      <p:regular r:id="rId27"/>
-      <p:bold r:id="rId28"/>
-      <p:italic r:id="rId29"/>
-      <p:boldItalic r:id="rId30"/>
+      <p:regular r:id="rId29"/>
+      <p:bold r:id="rId30"/>
+      <p:italic r:id="rId31"/>
+      <p:boldItalic r:id="rId32"/>
     </p:embeddedFont>
   </p:embeddedFontLst>
   <p:defaultTextStyle>
@@ -4896,6 +4898,13 @@
   <p:clrMapOvr>
     <a:masterClrMapping/>
   </p:clrMapOvr>
+  <p:timing>
+    <p:tnLst>
+      <p:par>
+        <p:cTn id="1" dur="indefinite" restart="never" nodeType="tmRoot"/>
+      </p:par>
+    </p:tnLst>
+  </p:timing>
 </p:sld>
 </file>
 
@@ -5340,10 +5349,298 @@
   <p:clrMapOvr>
     <a:masterClrMapping/>
   </p:clrMapOvr>
+  <p:timing>
+    <p:tnLst>
+      <p:par>
+        <p:cTn id="1" dur="indefinite" restart="never" nodeType="tmRoot"/>
+      </p:par>
+    </p:tnLst>
+  </p:timing>
 </p:sld>
 </file>
 
 <file path=ppt/slides/slide17.xml><?xml version="1.0" encoding="utf-8"?>
+<p:sld xmlns:a="http://schemas.openxmlformats.org/drawingml/2006/main" xmlns:r="http://schemas.openxmlformats.org/officeDocument/2006/relationships" xmlns:p="http://schemas.openxmlformats.org/presentationml/2006/main">
+  <p:cSld>
+    <p:spTree>
+      <p:nvGrpSpPr>
+        <p:cNvPr id="1" name=""/>
+        <p:cNvGrpSpPr/>
+        <p:nvPr/>
+      </p:nvGrpSpPr>
+      <p:grpSpPr>
+        <a:xfrm>
+          <a:off x="0" y="0"/>
+          <a:ext cx="0" cy="0"/>
+          <a:chOff x="0" y="0"/>
+          <a:chExt cx="0" cy="0"/>
+        </a:xfrm>
+      </p:grpSpPr>
+      <p:sp>
+        <p:nvSpPr>
+          <p:cNvPr id="2" name="Title 1"/>
+          <p:cNvSpPr>
+            <a:spLocks noGrp="1"/>
+          </p:cNvSpPr>
+          <p:nvPr>
+            <p:ph type="title"/>
+          </p:nvPr>
+        </p:nvSpPr>
+        <p:spPr>
+          <a:xfrm>
+            <a:off x="491837" y="231920"/>
+            <a:ext cx="7571700" cy="702600"/>
+          </a:xfrm>
+        </p:spPr>
+        <p:txBody>
+          <a:bodyPr/>
+          <a:lstStyle/>
+          <a:p>
+            <a:r>
+              <a:rPr lang="en-US" b="1" dirty="0" smtClean="0">
+                <a:solidFill>
+                  <a:srgbClr val="0D2192"/>
+                </a:solidFill>
+              </a:rPr>
+              <a:t>Bindings</a:t>
+            </a:r>
+            <a:endParaRPr lang="sr-Latn-RS" b="1" dirty="0">
+              <a:solidFill>
+                <a:srgbClr val="0D2192"/>
+              </a:solidFill>
+            </a:endParaRPr>
+          </a:p>
+        </p:txBody>
+      </p:sp>
+      <p:sp>
+        <p:nvSpPr>
+          <p:cNvPr id="5" name="Slide Number Placeholder 4"/>
+          <p:cNvSpPr>
+            <a:spLocks noGrp="1"/>
+          </p:cNvSpPr>
+          <p:nvPr>
+            <p:ph type="sldNum" idx="12"/>
+          </p:nvPr>
+        </p:nvSpPr>
+        <p:spPr/>
+        <p:txBody>
+          <a:bodyPr/>
+          <a:lstStyle/>
+          <a:p>
+            <a:pPr marL="0" lvl="0" indent="0" algn="r" rtl="0">
+              <a:spcBef>
+                <a:spcPts val="0"/>
+              </a:spcBef>
+              <a:spcAft>
+                <a:spcPts val="0"/>
+              </a:spcAft>
+              <a:buNone/>
+            </a:pPr>
+            <a:fld id="{00000000-1234-1234-1234-123412341234}" type="slidenum">
+              <a:rPr lang="en" smtClean="0"/>
+              <a:t>17</a:t>
+            </a:fld>
+            <a:endParaRPr lang="en"/>
+          </a:p>
+        </p:txBody>
+      </p:sp>
+      <p:sp>
+        <p:nvSpPr>
+          <p:cNvPr id="7" name="TextBox 6"/>
+          <p:cNvSpPr txBox="1"/>
+          <p:nvPr/>
+        </p:nvSpPr>
+        <p:spPr>
+          <a:xfrm>
+            <a:off x="491837" y="1010720"/>
+            <a:ext cx="4468091" cy="738664"/>
+          </a:xfrm>
+          <a:prstGeom prst="rect">
+            <a:avLst/>
+          </a:prstGeom>
+          <a:noFill/>
+        </p:spPr>
+        <p:txBody>
+          <a:bodyPr wrap="square" rtlCol="0">
+            <a:spAutoFit/>
+          </a:bodyPr>
+          <a:lstStyle/>
+          <a:p>
+            <a:r>
+              <a:rPr lang="sr-Latn-RS" dirty="0" smtClean="0">
+                <a:solidFill>
+                  <a:srgbClr val="0D2192"/>
+                </a:solidFill>
+                <a:latin typeface="Roboto Slab" panose="020B0604020202020204" charset="0"/>
+                <a:ea typeface="Roboto Slab" panose="020B0604020202020204" charset="0"/>
+              </a:rPr>
+              <a:t>Omogućava mikroservisima:</a:t>
+            </a:r>
+          </a:p>
+          <a:p>
+            <a:pPr marL="285750" indent="-285750">
+              <a:buFont typeface="Arial" panose="020B0604020202020204" pitchFamily="34" charset="0"/>
+              <a:buChar char="•"/>
+            </a:pPr>
+            <a:r>
+              <a:rPr lang="en-US" dirty="0" err="1" smtClean="0">
+                <a:solidFill>
+                  <a:srgbClr val="0D2192"/>
+                </a:solidFill>
+                <a:latin typeface="Roboto Slab" panose="020B0604020202020204" charset="0"/>
+                <a:ea typeface="Roboto Slab" panose="020B0604020202020204" charset="0"/>
+              </a:rPr>
+              <a:t>Hendlovanje</a:t>
+            </a:r>
+            <a:r>
+              <a:rPr lang="en-US" dirty="0" smtClean="0">
+                <a:solidFill>
+                  <a:srgbClr val="0D2192"/>
+                </a:solidFill>
+                <a:latin typeface="Roboto Slab" panose="020B0604020202020204" charset="0"/>
+                <a:ea typeface="Roboto Slab" panose="020B0604020202020204" charset="0"/>
+              </a:rPr>
+              <a:t> </a:t>
+            </a:r>
+            <a:r>
+              <a:rPr lang="en-US" dirty="0" err="1" smtClean="0">
+                <a:solidFill>
+                  <a:srgbClr val="0D2192"/>
+                </a:solidFill>
+                <a:latin typeface="Roboto Slab" panose="020B0604020202020204" charset="0"/>
+                <a:ea typeface="Roboto Slab" panose="020B0604020202020204" charset="0"/>
+              </a:rPr>
+              <a:t>doga</a:t>
+            </a:r>
+            <a:r>
+              <a:rPr lang="sr-Latn-RS" dirty="0" smtClean="0">
+                <a:solidFill>
+                  <a:srgbClr val="0D2192"/>
+                </a:solidFill>
+                <a:latin typeface="Roboto Slab" panose="020B0604020202020204" charset="0"/>
+                <a:ea typeface="Roboto Slab" panose="020B0604020202020204" charset="0"/>
+              </a:rPr>
+              <a:t>đaja iz eksternih sistema</a:t>
+            </a:r>
+          </a:p>
+          <a:p>
+            <a:pPr marL="285750" indent="-285750">
+              <a:buFont typeface="Arial" panose="020B0604020202020204" pitchFamily="34" charset="0"/>
+              <a:buChar char="•"/>
+            </a:pPr>
+            <a:r>
+              <a:rPr lang="sr-Latn-RS" dirty="0" smtClean="0">
+                <a:solidFill>
+                  <a:srgbClr val="0D2192"/>
+                </a:solidFill>
+                <a:latin typeface="Roboto Slab" panose="020B0604020202020204" charset="0"/>
+                <a:ea typeface="Roboto Slab" panose="020B0604020202020204" charset="0"/>
+              </a:rPr>
+              <a:t>Objavljivanje događaja eksternim sistemima</a:t>
+            </a:r>
+            <a:endParaRPr lang="sr-Latn-RS" dirty="0">
+              <a:solidFill>
+                <a:srgbClr val="0D2192"/>
+              </a:solidFill>
+              <a:latin typeface="Roboto Slab" panose="020B0604020202020204" charset="0"/>
+              <a:ea typeface="Roboto Slab" panose="020B0604020202020204" charset="0"/>
+            </a:endParaRPr>
+          </a:p>
+        </p:txBody>
+      </p:sp>
+      <p:pic>
+        <p:nvPicPr>
+          <p:cNvPr id="8" name="Picture 7"/>
+          <p:cNvPicPr>
+            <a:picLocks noChangeAspect="1"/>
+          </p:cNvPicPr>
+          <p:nvPr/>
+        </p:nvPicPr>
+        <p:blipFill>
+          <a:blip r:embed="rId2">
+            <a:extLst>
+              <a:ext uri="{28A0092B-C50C-407E-A947-70E740481C1C}">
+                <a14:useLocalDpi xmlns:a14="http://schemas.microsoft.com/office/drawing/2010/main" val="0"/>
+              </a:ext>
+            </a:extLst>
+          </a:blip>
+          <a:stretch>
+            <a:fillRect/>
+          </a:stretch>
+        </p:blipFill>
+        <p:spPr>
+          <a:xfrm>
+            <a:off x="858982" y="1918248"/>
+            <a:ext cx="7349836" cy="1784075"/>
+          </a:xfrm>
+          <a:prstGeom prst="rect">
+            <a:avLst/>
+          </a:prstGeom>
+        </p:spPr>
+      </p:pic>
+      <p:sp>
+        <p:nvSpPr>
+          <p:cNvPr id="9" name="TextBox 8"/>
+          <p:cNvSpPr txBox="1"/>
+          <p:nvPr/>
+        </p:nvSpPr>
+        <p:spPr>
+          <a:xfrm>
+            <a:off x="536864" y="4294909"/>
+            <a:ext cx="4523509" cy="307777"/>
+          </a:xfrm>
+          <a:prstGeom prst="rect">
+            <a:avLst/>
+          </a:prstGeom>
+          <a:noFill/>
+        </p:spPr>
+        <p:txBody>
+          <a:bodyPr wrap="square" rtlCol="0">
+            <a:spAutoFit/>
+          </a:bodyPr>
+          <a:lstStyle/>
+          <a:p>
+            <a:r>
+              <a:rPr lang="sr-Latn-RS" b="1" dirty="0" smtClean="0">
+                <a:solidFill>
+                  <a:srgbClr val="0D2192"/>
+                </a:solidFill>
+                <a:latin typeface="Roboto Slab" panose="020B0604020202020204" charset="0"/>
+                <a:ea typeface="Roboto Slab" panose="020B0604020202020204" charset="0"/>
+              </a:rPr>
+              <a:t>Nije isto što i pubslish/subscribe mehanizam! </a:t>
+            </a:r>
+            <a:endParaRPr lang="sr-Latn-RS" b="1" dirty="0">
+              <a:solidFill>
+                <a:srgbClr val="0D2192"/>
+              </a:solidFill>
+              <a:latin typeface="Roboto Slab" panose="020B0604020202020204" charset="0"/>
+              <a:ea typeface="Roboto Slab" panose="020B0604020202020204" charset="0"/>
+            </a:endParaRPr>
+          </a:p>
+        </p:txBody>
+      </p:sp>
+    </p:spTree>
+    <p:extLst>
+      <p:ext uri="{BB962C8B-B14F-4D97-AF65-F5344CB8AC3E}">
+        <p14:creationId xmlns:p14="http://schemas.microsoft.com/office/powerpoint/2010/main" val="658285959"/>
+      </p:ext>
+    </p:extLst>
+  </p:cSld>
+  <p:clrMapOvr>
+    <a:masterClrMapping/>
+  </p:clrMapOvr>
+  <p:timing>
+    <p:tnLst>
+      <p:par>
+        <p:cTn id="1" dur="indefinite" restart="never" nodeType="tmRoot"/>
+      </p:par>
+    </p:tnLst>
+  </p:timing>
+</p:sld>
+</file>
+
+<file path=ppt/slides/slide18.xml><?xml version="1.0" encoding="utf-8"?>
 <p:sld xmlns:a="http://schemas.openxmlformats.org/drawingml/2006/main" xmlns:r="http://schemas.openxmlformats.org/officeDocument/2006/relationships" xmlns:p="http://schemas.openxmlformats.org/presentationml/2006/main">
   <p:cSld>
     <p:spTree>
@@ -5422,120 +5719,22 @@
             </a:pPr>
             <a:fld id="{00000000-1234-1234-1234-123412341234}" type="slidenum">
               <a:rPr lang="en" smtClean="0"/>
-              <a:t>17</a:t>
+              <a:t>18</a:t>
             </a:fld>
             <a:endParaRPr lang="en"/>
-          </a:p>
-        </p:txBody>
-      </p:sp>
-    </p:spTree>
-    <p:extLst>
-      <p:ext uri="{BB962C8B-B14F-4D97-AF65-F5344CB8AC3E}">
-        <p14:creationId xmlns:p14="http://schemas.microsoft.com/office/powerpoint/2010/main" val="4269365210"/>
-      </p:ext>
-    </p:extLst>
-  </p:cSld>
-  <p:clrMapOvr>
-    <a:masterClrMapping/>
-  </p:clrMapOvr>
-</p:sld>
-</file>
-
-<file path=ppt/slides/slide18.xml><?xml version="1.0" encoding="utf-8"?>
-<p:sld xmlns:a="http://schemas.openxmlformats.org/drawingml/2006/main" xmlns:r="http://schemas.openxmlformats.org/officeDocument/2006/relationships" xmlns:p="http://schemas.openxmlformats.org/presentationml/2006/main">
-  <p:cSld>
-    <p:spTree>
-      <p:nvGrpSpPr>
-        <p:cNvPr id="1" name=""/>
-        <p:cNvGrpSpPr/>
-        <p:nvPr/>
-      </p:nvGrpSpPr>
-      <p:grpSpPr>
-        <a:xfrm>
-          <a:off x="0" y="0"/>
-          <a:ext cx="0" cy="0"/>
-          <a:chOff x="0" y="0"/>
-          <a:chExt cx="0" cy="0"/>
-        </a:xfrm>
-      </p:grpSpPr>
-      <p:sp>
-        <p:nvSpPr>
-          <p:cNvPr id="2" name="Title 1"/>
-          <p:cNvSpPr>
-            <a:spLocks noGrp="1"/>
-          </p:cNvSpPr>
-          <p:nvPr>
-            <p:ph type="title"/>
-          </p:nvPr>
-        </p:nvSpPr>
-        <p:spPr>
-          <a:xfrm>
-            <a:off x="760011" y="297669"/>
-            <a:ext cx="7571700" cy="702600"/>
-          </a:xfrm>
-        </p:spPr>
-        <p:txBody>
-          <a:bodyPr/>
-          <a:lstStyle/>
-          <a:p>
-            <a:r>
-              <a:rPr lang="en-US" dirty="0" smtClean="0">
-                <a:solidFill>
-                  <a:srgbClr val="0D2192"/>
-                </a:solidFill>
-              </a:rPr>
-              <a:t>State management</a:t>
-            </a:r>
-            <a:endParaRPr lang="sr-Latn-RS" dirty="0">
-              <a:solidFill>
-                <a:srgbClr val="0D2192"/>
-              </a:solidFill>
-            </a:endParaRPr>
           </a:p>
         </p:txBody>
       </p:sp>
       <p:sp>
         <p:nvSpPr>
-          <p:cNvPr id="5" name="Slide Number Placeholder 4"/>
-          <p:cNvSpPr>
-            <a:spLocks noGrp="1"/>
-          </p:cNvSpPr>
-          <p:nvPr>
-            <p:ph type="sldNum" idx="12"/>
-          </p:nvPr>
-        </p:nvSpPr>
-        <p:spPr/>
-        <p:txBody>
-          <a:bodyPr/>
-          <a:lstStyle/>
-          <a:p>
-            <a:pPr marL="0" lvl="0" indent="0" algn="r" rtl="0">
-              <a:spcBef>
-                <a:spcPts val="0"/>
-              </a:spcBef>
-              <a:spcAft>
-                <a:spcPts val="0"/>
-              </a:spcAft>
-              <a:buNone/>
-            </a:pPr>
-            <a:fld id="{00000000-1234-1234-1234-123412341234}" type="slidenum">
-              <a:rPr lang="en" smtClean="0"/>
-              <a:t>18</a:t>
-            </a:fld>
-            <a:endParaRPr lang="en"/>
-          </a:p>
-        </p:txBody>
-      </p:sp>
-      <p:sp>
-        <p:nvSpPr>
-          <p:cNvPr id="6" name="TextBox 5"/>
+          <p:cNvPr id="3" name="TextBox 2"/>
           <p:cNvSpPr txBox="1"/>
           <p:nvPr/>
         </p:nvSpPr>
         <p:spPr>
           <a:xfrm>
-            <a:off x="485939" y="1271976"/>
-            <a:ext cx="3688950" cy="2296796"/>
+            <a:off x="893617" y="1073727"/>
+            <a:ext cx="6622473" cy="738664"/>
           </a:xfrm>
           <a:prstGeom prst="rect">
             <a:avLst/>
@@ -5560,7 +5759,7 @@
                 <a:latin typeface="Roboto Slab" panose="020B0604020202020204" charset="0"/>
                 <a:ea typeface="Roboto Slab" panose="020B0604020202020204" charset="0"/>
               </a:rPr>
-              <a:t>Čuvanje, čitanje i pretraživanje key/value parova iz podržanih state store-ova</a:t>
+              <a:t>Trigeruje kod mikroservisa, događajem iz eksternog resursa</a:t>
             </a:r>
           </a:p>
           <a:p>
@@ -5576,7 +5775,7 @@
                 <a:latin typeface="Roboto Slab" panose="020B0604020202020204" charset="0"/>
                 <a:ea typeface="Roboto Slab" panose="020B0604020202020204" charset="0"/>
               </a:rPr>
-              <a:t>State store, tipična primena: korpa u online shop-u, stanje sesije tokom igranja igre...</a:t>
+              <a:t>Konfiguracija resursa vrši se u YAML fajlu komponente</a:t>
             </a:r>
           </a:p>
           <a:p>
@@ -5592,30 +5791,21 @@
                 <a:latin typeface="Roboto Slab" panose="020B0604020202020204" charset="0"/>
                 <a:ea typeface="Roboto Slab" panose="020B0604020202020204" charset="0"/>
               </a:rPr>
-              <a:t>HTTP POST za čuvanje i izvršenje upita nad key/value parovima</a:t>
-            </a:r>
-          </a:p>
-          <a:p>
-            <a:pPr marL="285750" indent="-285750">
-              <a:buFont typeface="Arial" panose="020B0604020202020204" pitchFamily="34" charset="0"/>
-              <a:buChar char="•"/>
-            </a:pPr>
-            <a:r>
-              <a:rPr lang="sr-Latn-RS" dirty="0" smtClean="0">
-                <a:solidFill>
-                  <a:srgbClr val="0D2192"/>
-                </a:solidFill>
-                <a:latin typeface="Roboto Slab" panose="020B0604020202020204" charset="0"/>
-                <a:ea typeface="Roboto Slab" panose="020B0604020202020204" charset="0"/>
-              </a:rPr>
-              <a:t>HTTP GET za čitanje vrednosti iza specificiranog ključa</a:t>
-            </a:r>
+              <a:t>Takođe, konfiguriše se public endpoint mikroservisa kao event handler</a:t>
+            </a:r>
+            <a:endParaRPr lang="sr-Latn-RS" dirty="0">
+              <a:solidFill>
+                <a:srgbClr val="0D2192"/>
+              </a:solidFill>
+              <a:latin typeface="Roboto Slab" panose="020B0604020202020204" charset="0"/>
+              <a:ea typeface="Roboto Slab" panose="020B0604020202020204" charset="0"/>
+            </a:endParaRPr>
           </a:p>
         </p:txBody>
       </p:sp>
       <p:pic>
         <p:nvPicPr>
-          <p:cNvPr id="7" name="Picture 6"/>
+          <p:cNvPr id="6" name="Picture 5"/>
           <p:cNvPicPr>
             <a:picLocks noChangeAspect="1"/>
           </p:cNvPicPr>
@@ -5635,8 +5825,8 @@
         </p:blipFill>
         <p:spPr>
           <a:xfrm>
-            <a:off x="4314350" y="1085414"/>
-            <a:ext cx="4680954" cy="2483358"/>
+            <a:off x="2187657" y="1812391"/>
+            <a:ext cx="4289344" cy="2868207"/>
           </a:xfrm>
           <a:prstGeom prst="rect">
             <a:avLst/>
@@ -5646,7 +5836,7 @@
     </p:spTree>
     <p:extLst>
       <p:ext uri="{BB962C8B-B14F-4D97-AF65-F5344CB8AC3E}">
-        <p14:creationId xmlns:p14="http://schemas.microsoft.com/office/powerpoint/2010/main" val="3802848732"/>
+        <p14:creationId xmlns:p14="http://schemas.microsoft.com/office/powerpoint/2010/main" val="4269365210"/>
       </p:ext>
     </p:extLst>
   </p:cSld>
@@ -5712,6 +5902,100 @@
           </a:p>
         </p:txBody>
       </p:sp>
+      <p:sp>
+        <p:nvSpPr>
+          <p:cNvPr id="6" name="TextBox 5"/>
+          <p:cNvSpPr txBox="1"/>
+          <p:nvPr/>
+        </p:nvSpPr>
+        <p:spPr>
+          <a:xfrm>
+            <a:off x="678872" y="886691"/>
+            <a:ext cx="6269182" cy="954107"/>
+          </a:xfrm>
+          <a:prstGeom prst="rect">
+            <a:avLst/>
+          </a:prstGeom>
+          <a:noFill/>
+        </p:spPr>
+        <p:txBody>
+          <a:bodyPr wrap="square" rtlCol="0">
+            <a:spAutoFit/>
+          </a:bodyPr>
+          <a:lstStyle/>
+          <a:p>
+            <a:pPr marL="285750" indent="-285750">
+              <a:buFont typeface="Arial" panose="020B0604020202020204" pitchFamily="34" charset="0"/>
+              <a:buChar char="•"/>
+            </a:pPr>
+            <a:r>
+              <a:rPr lang="sr-Latn-RS" dirty="0" smtClean="0">
+                <a:solidFill>
+                  <a:srgbClr val="0D2192"/>
+                </a:solidFill>
+                <a:latin typeface="Roboto Slab" panose="020B0604020202020204" charset="0"/>
+                <a:ea typeface="Roboto Slab" panose="020B0604020202020204" charset="0"/>
+              </a:rPr>
+              <a:t>Primena kod CameraDataCalculation servisa</a:t>
+            </a:r>
+          </a:p>
+          <a:p>
+            <a:pPr marL="285750" indent="-285750">
+              <a:buFont typeface="Arial" panose="020B0604020202020204" pitchFamily="34" charset="0"/>
+              <a:buChar char="•"/>
+            </a:pPr>
+            <a:r>
+              <a:rPr lang="sr-Latn-RS" dirty="0" smtClean="0">
+                <a:solidFill>
+                  <a:srgbClr val="0D2192"/>
+                </a:solidFill>
+                <a:latin typeface="Roboto Slab" panose="020B0604020202020204" charset="0"/>
+                <a:ea typeface="Roboto Slab" panose="020B0604020202020204" charset="0"/>
+              </a:rPr>
+              <a:t>Hendluje se događaj sa eksternog servisa CameraSimulation</a:t>
+            </a:r>
+          </a:p>
+          <a:p>
+            <a:pPr marL="285750" indent="-285750">
+              <a:buFont typeface="Arial" panose="020B0604020202020204" pitchFamily="34" charset="0"/>
+              <a:buChar char="•"/>
+            </a:pPr>
+            <a:r>
+              <a:rPr lang="sr-Latn-RS" dirty="0" smtClean="0">
+                <a:solidFill>
+                  <a:srgbClr val="0D2192"/>
+                </a:solidFill>
+                <a:latin typeface="Roboto Slab" panose="020B0604020202020204" charset="0"/>
+                <a:ea typeface="Roboto Slab" panose="020B0604020202020204" charset="0"/>
+              </a:rPr>
+              <a:t>Iskorišćen Mqtt input binding, česta primena kod IoT sistema</a:t>
+            </a:r>
+          </a:p>
+          <a:p>
+            <a:pPr marL="285750" indent="-285750">
+              <a:buFont typeface="Arial" panose="020B0604020202020204" pitchFamily="34" charset="0"/>
+              <a:buChar char="•"/>
+            </a:pPr>
+            <a:r>
+              <a:rPr lang="sr-Latn-RS" dirty="0" smtClean="0">
+                <a:solidFill>
+                  <a:srgbClr val="0D2192"/>
+                </a:solidFill>
+                <a:latin typeface="Roboto Slab" panose="020B0604020202020204" charset="0"/>
+                <a:ea typeface="Roboto Slab" panose="020B0604020202020204" charset="0"/>
+              </a:rPr>
+              <a:t>Eclipse Mosquitto, kao Mqtt message brocker</a:t>
+            </a:r>
+            <a:endParaRPr lang="sr-Latn-RS" dirty="0">
+              <a:solidFill>
+                <a:srgbClr val="0D2192"/>
+              </a:solidFill>
+              <a:latin typeface="Roboto Slab" panose="020B0604020202020204" charset="0"/>
+              <a:ea typeface="Roboto Slab" panose="020B0604020202020204" charset="0"/>
+            </a:endParaRPr>
+          </a:p>
+        </p:txBody>
+      </p:sp>
       <p:pic>
         <p:nvPicPr>
           <p:cNvPr id="7" name="Picture 6"/>
@@ -5728,312 +6012,17 @@
         </p:blipFill>
         <p:spPr>
           <a:xfrm>
-            <a:off x="6188650" y="733961"/>
-            <a:ext cx="2137357" cy="2292374"/>
+            <a:off x="6531710" y="159328"/>
+            <a:ext cx="2271715" cy="2779434"/>
           </a:xfrm>
           <a:prstGeom prst="rect">
             <a:avLst/>
           </a:prstGeom>
         </p:spPr>
       </p:pic>
-      <p:sp>
-        <p:nvSpPr>
-          <p:cNvPr id="8" name="TextBox 7"/>
-          <p:cNvSpPr txBox="1"/>
-          <p:nvPr/>
-        </p:nvSpPr>
-        <p:spPr>
-          <a:xfrm>
-            <a:off x="564120" y="926041"/>
-            <a:ext cx="5721728" cy="954107"/>
-          </a:xfrm>
-          <a:prstGeom prst="rect">
-            <a:avLst/>
-          </a:prstGeom>
-          <a:noFill/>
-        </p:spPr>
-        <p:txBody>
-          <a:bodyPr wrap="square" rtlCol="0">
-            <a:spAutoFit/>
-          </a:bodyPr>
-          <a:lstStyle/>
-          <a:p>
-            <a:pPr marL="285750" indent="-285750">
-              <a:buFont typeface="Arial" panose="020B0604020202020204" pitchFamily="34" charset="0"/>
-              <a:buChar char="•"/>
-            </a:pPr>
-            <a:r>
-              <a:rPr lang="en-US" dirty="0" err="1" smtClean="0">
-                <a:solidFill>
-                  <a:srgbClr val="0D2192"/>
-                </a:solidFill>
-                <a:latin typeface="Roboto Slab" panose="020B0604020202020204" charset="0"/>
-                <a:ea typeface="Roboto Slab" panose="020B0604020202020204" charset="0"/>
-              </a:rPr>
-              <a:t>Dodatni</a:t>
-            </a:r>
-            <a:r>
-              <a:rPr lang="en-US" dirty="0" smtClean="0">
-                <a:solidFill>
-                  <a:srgbClr val="0D2192"/>
-                </a:solidFill>
-                <a:latin typeface="Roboto Slab" panose="020B0604020202020204" charset="0"/>
-                <a:ea typeface="Roboto Slab" panose="020B0604020202020204" charset="0"/>
-              </a:rPr>
-              <a:t> </a:t>
-            </a:r>
-            <a:r>
-              <a:rPr lang="en-US" dirty="0" err="1" smtClean="0">
-                <a:solidFill>
-                  <a:srgbClr val="0D2192"/>
-                </a:solidFill>
-                <a:latin typeface="Roboto Slab" panose="020B0604020202020204" charset="0"/>
-                <a:ea typeface="Roboto Slab" panose="020B0604020202020204" charset="0"/>
-              </a:rPr>
-              <a:t>metapodaci</a:t>
-            </a:r>
-            <a:r>
-              <a:rPr lang="en-US" dirty="0" smtClean="0">
-                <a:solidFill>
-                  <a:srgbClr val="0D2192"/>
-                </a:solidFill>
-                <a:latin typeface="Roboto Slab" panose="020B0604020202020204" charset="0"/>
-                <a:ea typeface="Roboto Slab" panose="020B0604020202020204" charset="0"/>
-              </a:rPr>
-              <a:t> </a:t>
-            </a:r>
-            <a:r>
-              <a:rPr lang="en-US" dirty="0" err="1" smtClean="0">
-                <a:solidFill>
-                  <a:srgbClr val="0D2192"/>
-                </a:solidFill>
-                <a:latin typeface="Roboto Slab" panose="020B0604020202020204" charset="0"/>
-                <a:ea typeface="Roboto Slab" panose="020B0604020202020204" charset="0"/>
-              </a:rPr>
-              <a:t>koji</a:t>
-            </a:r>
-            <a:r>
-              <a:rPr lang="en-US" dirty="0" smtClean="0">
-                <a:solidFill>
-                  <a:srgbClr val="0D2192"/>
-                </a:solidFill>
-                <a:latin typeface="Roboto Slab" panose="020B0604020202020204" charset="0"/>
-                <a:ea typeface="Roboto Slab" panose="020B0604020202020204" charset="0"/>
-              </a:rPr>
-              <a:t> </a:t>
-            </a:r>
-            <a:r>
-              <a:rPr lang="en-US" dirty="0" err="1" smtClean="0">
-                <a:solidFill>
-                  <a:srgbClr val="0D2192"/>
-                </a:solidFill>
-                <a:latin typeface="Roboto Slab" panose="020B0604020202020204" charset="0"/>
-                <a:ea typeface="Roboto Slab" panose="020B0604020202020204" charset="0"/>
-              </a:rPr>
-              <a:t>opisuju</a:t>
-            </a:r>
-            <a:r>
-              <a:rPr lang="en-US" dirty="0">
-                <a:solidFill>
-                  <a:srgbClr val="0D2192"/>
-                </a:solidFill>
-                <a:latin typeface="Roboto Slab" panose="020B0604020202020204" charset="0"/>
-                <a:ea typeface="Roboto Slab" panose="020B0604020202020204" charset="0"/>
-              </a:rPr>
-              <a:t> </a:t>
-            </a:r>
-            <a:r>
-              <a:rPr lang="en-US" dirty="0" err="1" smtClean="0">
-                <a:solidFill>
-                  <a:srgbClr val="0D2192"/>
-                </a:solidFill>
-                <a:latin typeface="Roboto Slab" panose="020B0604020202020204" charset="0"/>
-                <a:ea typeface="Roboto Slab" panose="020B0604020202020204" charset="0"/>
-              </a:rPr>
-              <a:t>zahteve</a:t>
-            </a:r>
-            <a:r>
-              <a:rPr lang="en-US" dirty="0" smtClean="0">
-                <a:solidFill>
-                  <a:srgbClr val="0D2192"/>
-                </a:solidFill>
-                <a:latin typeface="Roboto Slab" panose="020B0604020202020204" charset="0"/>
-                <a:ea typeface="Roboto Slab" panose="020B0604020202020204" charset="0"/>
-              </a:rPr>
-              <a:t> </a:t>
-            </a:r>
-            <a:r>
-              <a:rPr lang="en-US" dirty="0" err="1" smtClean="0">
-                <a:solidFill>
-                  <a:srgbClr val="0D2192"/>
-                </a:solidFill>
-                <a:latin typeface="Roboto Slab" panose="020B0604020202020204" charset="0"/>
-                <a:ea typeface="Roboto Slab" panose="020B0604020202020204" charset="0"/>
-              </a:rPr>
-              <a:t>konkurentnosti</a:t>
-            </a:r>
-            <a:r>
-              <a:rPr lang="en-US" dirty="0" smtClean="0">
-                <a:solidFill>
-                  <a:srgbClr val="0D2192"/>
-                </a:solidFill>
-                <a:latin typeface="Roboto Slab" panose="020B0604020202020204" charset="0"/>
-                <a:ea typeface="Roboto Slab" panose="020B0604020202020204" charset="0"/>
-              </a:rPr>
-              <a:t> I </a:t>
-            </a:r>
-            <a:r>
-              <a:rPr lang="en-US" dirty="0" err="1" smtClean="0">
-                <a:solidFill>
-                  <a:srgbClr val="0D2192"/>
-                </a:solidFill>
-                <a:latin typeface="Roboto Slab" panose="020B0604020202020204" charset="0"/>
-                <a:ea typeface="Roboto Slab" panose="020B0604020202020204" charset="0"/>
-              </a:rPr>
-              <a:t>konzistentnosti</a:t>
-            </a:r>
-            <a:endParaRPr lang="en-US" dirty="0" smtClean="0">
-              <a:solidFill>
-                <a:srgbClr val="0D2192"/>
-              </a:solidFill>
-              <a:latin typeface="Roboto Slab" panose="020B0604020202020204" charset="0"/>
-              <a:ea typeface="Roboto Slab" panose="020B0604020202020204" charset="0"/>
-            </a:endParaRPr>
-          </a:p>
-          <a:p>
-            <a:pPr marL="285750" indent="-285750">
-              <a:buFont typeface="Arial" panose="020B0604020202020204" pitchFamily="34" charset="0"/>
-              <a:buChar char="•"/>
-            </a:pPr>
-            <a:r>
-              <a:rPr lang="en-US" dirty="0" smtClean="0">
-                <a:solidFill>
-                  <a:srgbClr val="0D2192"/>
-                </a:solidFill>
-                <a:latin typeface="Roboto Slab" panose="020B0604020202020204" charset="0"/>
-                <a:ea typeface="Roboto Slab" panose="020B0604020202020204" charset="0"/>
-              </a:rPr>
-              <a:t>Po default-u: </a:t>
-            </a:r>
-            <a:r>
-              <a:rPr lang="en-US" b="1" dirty="0" smtClean="0">
-                <a:solidFill>
-                  <a:srgbClr val="0D2192"/>
-                </a:solidFill>
-                <a:latin typeface="Roboto Slab" panose="020B0604020202020204" charset="0"/>
-                <a:ea typeface="Roboto Slab" panose="020B0604020202020204" charset="0"/>
-              </a:rPr>
-              <a:t>eventually consistent </a:t>
-            </a:r>
-            <a:r>
-              <a:rPr lang="en-US" dirty="0" err="1" smtClean="0">
-                <a:solidFill>
-                  <a:srgbClr val="0D2192"/>
-                </a:solidFill>
-                <a:latin typeface="Roboto Slab" panose="020B0604020202020204" charset="0"/>
-                <a:ea typeface="Roboto Slab" panose="020B0604020202020204" charset="0"/>
-              </a:rPr>
-              <a:t>i</a:t>
-            </a:r>
-            <a:r>
-              <a:rPr lang="en-US" dirty="0" smtClean="0">
-                <a:solidFill>
-                  <a:srgbClr val="0D2192"/>
-                </a:solidFill>
-                <a:latin typeface="Roboto Slab" panose="020B0604020202020204" charset="0"/>
-                <a:ea typeface="Roboto Slab" panose="020B0604020202020204" charset="0"/>
-              </a:rPr>
-              <a:t> </a:t>
-            </a:r>
-            <a:r>
-              <a:rPr lang="en-US" b="1" dirty="0" smtClean="0">
-                <a:solidFill>
-                  <a:srgbClr val="0D2192"/>
-                </a:solidFill>
-                <a:latin typeface="Roboto Slab" panose="020B0604020202020204" charset="0"/>
-                <a:ea typeface="Roboto Slab" panose="020B0604020202020204" charset="0"/>
-              </a:rPr>
-              <a:t>last-write-wins</a:t>
-            </a:r>
-          </a:p>
-          <a:p>
-            <a:pPr marL="285750" indent="-285750">
-              <a:buFont typeface="Arial" panose="020B0604020202020204" pitchFamily="34" charset="0"/>
-              <a:buChar char="•"/>
-            </a:pPr>
-            <a:r>
-              <a:rPr lang="en-US" dirty="0" err="1" smtClean="0">
-                <a:solidFill>
-                  <a:srgbClr val="0D2192"/>
-                </a:solidFill>
-                <a:latin typeface="Roboto Slab" panose="020B0604020202020204" charset="0"/>
-                <a:ea typeface="Roboto Slab" panose="020B0604020202020204" charset="0"/>
-              </a:rPr>
-              <a:t>Podr</a:t>
-            </a:r>
-            <a:r>
-              <a:rPr lang="sr-Latn-RS" dirty="0" smtClean="0">
-                <a:solidFill>
-                  <a:srgbClr val="0D2192"/>
-                </a:solidFill>
-                <a:latin typeface="Roboto Slab" panose="020B0604020202020204" charset="0"/>
-                <a:ea typeface="Roboto Slab" panose="020B0604020202020204" charset="0"/>
-              </a:rPr>
-              <a:t>žane </a:t>
-            </a:r>
-            <a:r>
-              <a:rPr lang="sr-Latn-RS" b="1" dirty="0" smtClean="0">
-                <a:solidFill>
-                  <a:srgbClr val="0D2192"/>
-                </a:solidFill>
-                <a:latin typeface="Roboto Slab" panose="020B0604020202020204" charset="0"/>
-                <a:ea typeface="Roboto Slab" panose="020B0604020202020204" charset="0"/>
-              </a:rPr>
-              <a:t>bulk </a:t>
-            </a:r>
-            <a:r>
-              <a:rPr lang="sr-Latn-RS" dirty="0" smtClean="0">
-                <a:solidFill>
-                  <a:srgbClr val="0D2192"/>
-                </a:solidFill>
-                <a:latin typeface="Roboto Slab" panose="020B0604020202020204" charset="0"/>
-                <a:ea typeface="Roboto Slab" panose="020B0604020202020204" charset="0"/>
-              </a:rPr>
-              <a:t>i </a:t>
-            </a:r>
-            <a:r>
-              <a:rPr lang="sr-Latn-RS" b="1" dirty="0" smtClean="0">
-                <a:solidFill>
-                  <a:srgbClr val="0D2192"/>
-                </a:solidFill>
-                <a:latin typeface="Roboto Slab" panose="020B0604020202020204" charset="0"/>
-                <a:ea typeface="Roboto Slab" panose="020B0604020202020204" charset="0"/>
-              </a:rPr>
-              <a:t>transakcione </a:t>
-            </a:r>
-            <a:r>
-              <a:rPr lang="sr-Latn-RS" dirty="0" smtClean="0">
-                <a:solidFill>
-                  <a:srgbClr val="0D2192"/>
-                </a:solidFill>
-                <a:latin typeface="Roboto Slab" panose="020B0604020202020204" charset="0"/>
-                <a:ea typeface="Roboto Slab" panose="020B0604020202020204" charset="0"/>
-              </a:rPr>
-              <a:t>operacije</a:t>
-            </a:r>
-            <a:endParaRPr lang="en-US" dirty="0">
-              <a:solidFill>
-                <a:srgbClr val="0D2192"/>
-              </a:solidFill>
-              <a:latin typeface="Roboto Slab" panose="020B0604020202020204" charset="0"/>
-              <a:ea typeface="Roboto Slab" panose="020B0604020202020204" charset="0"/>
-            </a:endParaRPr>
-          </a:p>
-        </p:txBody>
-      </p:sp>
       <p:pic>
         <p:nvPicPr>
-          <p:cNvPr id="12" name="Picture 11"/>
+          <p:cNvPr id="8" name="Picture 7"/>
           <p:cNvPicPr>
             <a:picLocks noChangeAspect="1"/>
           </p:cNvPicPr>
@@ -6047,77 +6036,8 @@
         </p:blipFill>
         <p:spPr>
           <a:xfrm>
-            <a:off x="744107" y="3263141"/>
-            <a:ext cx="7581900" cy="409575"/>
-          </a:xfrm>
-          <a:prstGeom prst="rect">
-            <a:avLst/>
-          </a:prstGeom>
-        </p:spPr>
-      </p:pic>
-      <p:sp>
-        <p:nvSpPr>
-          <p:cNvPr id="14" name="Rectangle 13"/>
-          <p:cNvSpPr/>
-          <p:nvPr/>
-        </p:nvSpPr>
-        <p:spPr>
-          <a:xfrm>
-            <a:off x="564120" y="2465154"/>
-            <a:ext cx="4572000" cy="523220"/>
-          </a:xfrm>
-          <a:prstGeom prst="rect">
-            <a:avLst/>
-          </a:prstGeom>
-        </p:spPr>
-        <p:txBody>
-          <a:bodyPr>
-            <a:spAutoFit/>
-          </a:bodyPr>
-          <a:lstStyle/>
-          <a:p>
-            <a:pPr marL="285750" indent="-285750">
-              <a:buFont typeface="Arial" panose="020B0604020202020204" pitchFamily="34" charset="0"/>
-              <a:buChar char="•"/>
-            </a:pPr>
-            <a:r>
-              <a:rPr lang="sr-Latn-RS" dirty="0">
-                <a:solidFill>
-                  <a:srgbClr val="0D2192"/>
-                </a:solidFill>
-                <a:latin typeface="Roboto Slab" panose="020B0604020202020204" charset="0"/>
-                <a:ea typeface="Roboto Slab" panose="020B0604020202020204" charset="0"/>
-              </a:rPr>
-              <a:t>Primena kod Camera Data Calculation service, izrađenog u .Net-u</a:t>
-            </a:r>
-            <a:endParaRPr lang="sr-Latn-RS" dirty="0">
-              <a:solidFill>
-                <a:srgbClr val="0D2192"/>
-              </a:solidFill>
-              <a:latin typeface="Roboto Slab" panose="020B0604020202020204" charset="0"/>
-              <a:ea typeface="Roboto Slab" panose="020B0604020202020204" charset="0"/>
-            </a:endParaRPr>
-          </a:p>
-        </p:txBody>
-      </p:sp>
-      <p:pic>
-        <p:nvPicPr>
-          <p:cNvPr id="15" name="Picture 14"/>
-          <p:cNvPicPr>
-            <a:picLocks noChangeAspect="1"/>
-          </p:cNvPicPr>
-          <p:nvPr/>
-        </p:nvPicPr>
-        <p:blipFill>
-          <a:blip r:embed="rId4"/>
-          <a:stretch>
-            <a:fillRect/>
-          </a:stretch>
-        </p:blipFill>
-        <p:spPr>
-          <a:xfrm>
-            <a:off x="1334574" y="3904642"/>
-            <a:ext cx="5781675" cy="466725"/>
+            <a:off x="612385" y="3036413"/>
+            <a:ext cx="6858679" cy="1615787"/>
           </a:xfrm>
           <a:prstGeom prst="rect">
             <a:avLst/>
@@ -6127,20 +6047,13 @@
     </p:spTree>
     <p:extLst>
       <p:ext uri="{BB962C8B-B14F-4D97-AF65-F5344CB8AC3E}">
-        <p14:creationId xmlns:p14="http://schemas.microsoft.com/office/powerpoint/2010/main" val="3837750589"/>
+        <p14:creationId xmlns:p14="http://schemas.microsoft.com/office/powerpoint/2010/main" val="1027877921"/>
       </p:ext>
     </p:extLst>
   </p:cSld>
   <p:clrMapOvr>
     <a:masterClrMapping/>
   </p:clrMapOvr>
-  <p:timing>
-    <p:tnLst>
-      <p:par>
-        <p:cTn id="1" dur="indefinite" restart="never" nodeType="tmRoot"/>
-      </p:par>
-    </p:tnLst>
-  </p:timing>
 </p:sld>
 </file>
 
@@ -6345,7 +6258,12 @@
             <p:ph type="title"/>
           </p:nvPr>
         </p:nvSpPr>
-        <p:spPr/>
+        <p:spPr>
+          <a:xfrm>
+            <a:off x="760011" y="297669"/>
+            <a:ext cx="7571700" cy="702600"/>
+          </a:xfrm>
+        </p:spPr>
         <p:txBody>
           <a:bodyPr/>
           <a:lstStyle/>
@@ -6355,47 +6273,13 @@
                 <a:solidFill>
                   <a:srgbClr val="0D2192"/>
                 </a:solidFill>
-                <a:latin typeface="Roboto Slab" panose="020B0604020202020204" charset="0"/>
-                <a:ea typeface="Roboto Slab" panose="020B0604020202020204" charset="0"/>
-              </a:rPr>
-              <a:t>Publish</a:t>
-            </a:r>
-            <a:r>
-              <a:rPr lang="sr-Latn-RS" dirty="0">
-                <a:solidFill>
-                  <a:srgbClr val="0D2192"/>
-                </a:solidFill>
-                <a:latin typeface="Roboto Slab" panose="020B0604020202020204" charset="0"/>
-                <a:ea typeface="Roboto Slab" panose="020B0604020202020204" charset="0"/>
-              </a:rPr>
-              <a:t> </a:t>
-            </a:r>
-            <a:r>
-              <a:rPr lang="sr-Latn-RS" dirty="0" smtClean="0">
-                <a:solidFill>
-                  <a:srgbClr val="0D2192"/>
-                </a:solidFill>
-                <a:latin typeface="Roboto Slab" panose="020B0604020202020204" charset="0"/>
-                <a:ea typeface="Roboto Slab" panose="020B0604020202020204" charset="0"/>
-              </a:rPr>
-              <a:t>&amp; </a:t>
-            </a:r>
-            <a:r>
-              <a:rPr lang="en-US" dirty="0" smtClean="0">
-                <a:solidFill>
-                  <a:srgbClr val="0D2192"/>
-                </a:solidFill>
-                <a:latin typeface="Roboto Slab" panose="020B0604020202020204" charset="0"/>
-                <a:ea typeface="Roboto Slab" panose="020B0604020202020204" charset="0"/>
-              </a:rPr>
-              <a:t>Subscribe</a:t>
+              </a:rPr>
+              <a:t>State management</a:t>
             </a:r>
             <a:endParaRPr lang="sr-Latn-RS" dirty="0">
               <a:solidFill>
                 <a:srgbClr val="0D2192"/>
               </a:solidFill>
-              <a:latin typeface="Roboto Slab" panose="020B0604020202020204" charset="0"/>
-              <a:ea typeface="Roboto Slab" panose="020B0604020202020204" charset="0"/>
             </a:endParaRPr>
           </a:p>
         </p:txBody>
@@ -6440,8 +6324,8 @@
         </p:nvSpPr>
         <p:spPr>
           <a:xfrm>
-            <a:off x="598992" y="1240589"/>
-            <a:ext cx="3694945" cy="3108543"/>
+            <a:off x="485939" y="1271976"/>
+            <a:ext cx="3688950" cy="2296796"/>
           </a:xfrm>
           <a:prstGeom prst="rect">
             <a:avLst/>
@@ -6466,17 +6350,7 @@
                 <a:latin typeface="Roboto Slab" panose="020B0604020202020204" charset="0"/>
                 <a:ea typeface="Roboto Slab" panose="020B0604020202020204" charset="0"/>
               </a:rPr>
-              <a:t>Objaviljivač (publisher) šalje poruke preko ulaznog kanala, na određenu temu </a:t>
-            </a:r>
-            <a:r>
-              <a:rPr lang="sr-Latn-RS" b="1" dirty="0" smtClean="0">
-                <a:solidFill>
-                  <a:srgbClr val="0D2192"/>
-                </a:solidFill>
-                <a:latin typeface="Roboto Slab" panose="020B0604020202020204" charset="0"/>
-                <a:ea typeface="Roboto Slab" panose="020B0604020202020204" charset="0"/>
-              </a:rPr>
-              <a:t>(topic)</a:t>
+              <a:t>Čuvanje, čitanje i pretraživanje key/value parova iz podržanih state store-ova</a:t>
             </a:r>
           </a:p>
           <a:p>
@@ -6492,7 +6366,7 @@
                 <a:latin typeface="Roboto Slab" panose="020B0604020202020204" charset="0"/>
                 <a:ea typeface="Roboto Slab" panose="020B0604020202020204" charset="0"/>
               </a:rPr>
-              <a:t>Pretplatnik (subscriber) se pretplaćuje na temu i prima poruke sa izlaznog kanala</a:t>
+              <a:t>State store, tipična primena: korpa u online shop-u, stanje sesije tokom igranja igre...</a:t>
             </a:r>
           </a:p>
           <a:p>
@@ -6508,7 +6382,7 @@
                 <a:latin typeface="Roboto Slab" panose="020B0604020202020204" charset="0"/>
                 <a:ea typeface="Roboto Slab" panose="020B0604020202020204" charset="0"/>
               </a:rPr>
-              <a:t>Queueing mehanizam message brocker-a, garantuje trajnost, čuvanjem poruka</a:t>
+              <a:t>HTTP POST za čuvanje i izvršenje upita nad key/value parovima</a:t>
             </a:r>
           </a:p>
           <a:p>
@@ -6524,45 +6398,16 @@
                 <a:latin typeface="Roboto Slab" panose="020B0604020202020204" charset="0"/>
                 <a:ea typeface="Roboto Slab" panose="020B0604020202020204" charset="0"/>
               </a:rPr>
-              <a:t>Pretplatnici ne moraju biti odmah dostupni</a:t>
-            </a:r>
-          </a:p>
-          <a:p>
-            <a:pPr marL="285750" indent="-285750">
-              <a:buFont typeface="Arial" panose="020B0604020202020204" pitchFamily="34" charset="0"/>
-              <a:buChar char="•"/>
-            </a:pPr>
-            <a:r>
-              <a:rPr lang="sr-Latn-RS" dirty="0" smtClean="0">
-                <a:solidFill>
-                  <a:srgbClr val="0D2192"/>
-                </a:solidFill>
-                <a:latin typeface="Roboto Slab" panose="020B0604020202020204" charset="0"/>
-                <a:ea typeface="Roboto Slab" panose="020B0604020202020204" charset="0"/>
-              </a:rPr>
-              <a:t>DAPR garantuje At-Least-Once semantiku</a:t>
-            </a:r>
-          </a:p>
-          <a:p>
-            <a:pPr marL="285750" indent="-285750">
-              <a:buFont typeface="Arial" panose="020B0604020202020204" pitchFamily="34" charset="0"/>
-              <a:buChar char="•"/>
-            </a:pPr>
-            <a:endParaRPr lang="sr-Latn-RS" dirty="0">
-              <a:solidFill>
-                <a:srgbClr val="0D2192"/>
-              </a:solidFill>
-              <a:latin typeface="Roboto Slab" panose="020B0604020202020204" charset="0"/>
-              <a:ea typeface="Roboto Slab" panose="020B0604020202020204" charset="0"/>
-            </a:endParaRPr>
+              <a:t>HTTP GET za čitanje vrednosti iza specificiranog ključa</a:t>
+            </a:r>
           </a:p>
         </p:txBody>
       </p:sp>
       <p:pic>
         <p:nvPicPr>
-          <p:cNvPr id="3080" name="Picture 8" descr="https://docs.dapr.io/images/pubsub-overview-pattern.png"/>
+          <p:cNvPr id="7" name="Picture 6"/>
           <p:cNvPicPr>
-            <a:picLocks noChangeAspect="1" noChangeArrowheads="1"/>
+            <a:picLocks noChangeAspect="1"/>
           </p:cNvPicPr>
           <p:nvPr/>
         </p:nvPicPr>
@@ -6574,35 +6419,24 @@
               </a:ext>
             </a:extLst>
           </a:blip>
-          <a:srcRect/>
           <a:stretch>
             <a:fillRect/>
           </a:stretch>
         </p:blipFill>
-        <p:spPr bwMode="auto">
+        <p:spPr>
           <a:xfrm>
-            <a:off x="4646864" y="1527373"/>
-            <a:ext cx="4256004" cy="1665005"/>
+            <a:off x="4314350" y="1085414"/>
+            <a:ext cx="4680954" cy="2483358"/>
           </a:xfrm>
           <a:prstGeom prst="rect">
             <a:avLst/>
           </a:prstGeom>
-          <a:noFill/>
-          <a:extLst>
-            <a:ext uri="{909E8E84-426E-40DD-AFC4-6F175D3DCCD1}">
-              <a14:hiddenFill xmlns:a14="http://schemas.microsoft.com/office/drawing/2010/main">
-                <a:solidFill>
-                  <a:srgbClr val="FFFFFF"/>
-                </a:solidFill>
-              </a14:hiddenFill>
-            </a:ext>
-          </a:extLst>
         </p:spPr>
       </p:pic>
     </p:spTree>
     <p:extLst>
       <p:ext uri="{BB962C8B-B14F-4D97-AF65-F5344CB8AC3E}">
-        <p14:creationId xmlns:p14="http://schemas.microsoft.com/office/powerpoint/2010/main" val="3519485315"/>
+        <p14:creationId xmlns:p14="http://schemas.microsoft.com/office/powerpoint/2010/main" val="3802848732"/>
       </p:ext>
     </p:extLst>
   </p:cSld>
@@ -6663,6 +6497,781 @@
             <a:fld id="{00000000-1234-1234-1234-123412341234}" type="slidenum">
               <a:rPr lang="en" smtClean="0"/>
               <a:t>21</a:t>
+            </a:fld>
+            <a:endParaRPr lang="en"/>
+          </a:p>
+        </p:txBody>
+      </p:sp>
+      <p:pic>
+        <p:nvPicPr>
+          <p:cNvPr id="7" name="Picture 6"/>
+          <p:cNvPicPr>
+            <a:picLocks noChangeAspect="1"/>
+          </p:cNvPicPr>
+          <p:nvPr/>
+        </p:nvPicPr>
+        <p:blipFill>
+          <a:blip r:embed="rId2"/>
+          <a:stretch>
+            <a:fillRect/>
+          </a:stretch>
+        </p:blipFill>
+        <p:spPr>
+          <a:xfrm>
+            <a:off x="6188650" y="733961"/>
+            <a:ext cx="2137357" cy="2292374"/>
+          </a:xfrm>
+          <a:prstGeom prst="rect">
+            <a:avLst/>
+          </a:prstGeom>
+        </p:spPr>
+      </p:pic>
+      <p:sp>
+        <p:nvSpPr>
+          <p:cNvPr id="8" name="TextBox 7"/>
+          <p:cNvSpPr txBox="1"/>
+          <p:nvPr/>
+        </p:nvSpPr>
+        <p:spPr>
+          <a:xfrm>
+            <a:off x="564120" y="926041"/>
+            <a:ext cx="5721728" cy="954107"/>
+          </a:xfrm>
+          <a:prstGeom prst="rect">
+            <a:avLst/>
+          </a:prstGeom>
+          <a:noFill/>
+        </p:spPr>
+        <p:txBody>
+          <a:bodyPr wrap="square" rtlCol="0">
+            <a:spAutoFit/>
+          </a:bodyPr>
+          <a:lstStyle/>
+          <a:p>
+            <a:pPr marL="285750" indent="-285750">
+              <a:buFont typeface="Arial" panose="020B0604020202020204" pitchFamily="34" charset="0"/>
+              <a:buChar char="•"/>
+            </a:pPr>
+            <a:r>
+              <a:rPr lang="en-US" dirty="0" err="1" smtClean="0">
+                <a:solidFill>
+                  <a:srgbClr val="0D2192"/>
+                </a:solidFill>
+                <a:latin typeface="Roboto Slab" panose="020B0604020202020204" charset="0"/>
+                <a:ea typeface="Roboto Slab" panose="020B0604020202020204" charset="0"/>
+              </a:rPr>
+              <a:t>Dodatni</a:t>
+            </a:r>
+            <a:r>
+              <a:rPr lang="en-US" dirty="0" smtClean="0">
+                <a:solidFill>
+                  <a:srgbClr val="0D2192"/>
+                </a:solidFill>
+                <a:latin typeface="Roboto Slab" panose="020B0604020202020204" charset="0"/>
+                <a:ea typeface="Roboto Slab" panose="020B0604020202020204" charset="0"/>
+              </a:rPr>
+              <a:t> </a:t>
+            </a:r>
+            <a:r>
+              <a:rPr lang="en-US" dirty="0" err="1" smtClean="0">
+                <a:solidFill>
+                  <a:srgbClr val="0D2192"/>
+                </a:solidFill>
+                <a:latin typeface="Roboto Slab" panose="020B0604020202020204" charset="0"/>
+                <a:ea typeface="Roboto Slab" panose="020B0604020202020204" charset="0"/>
+              </a:rPr>
+              <a:t>metapodaci</a:t>
+            </a:r>
+            <a:r>
+              <a:rPr lang="en-US" dirty="0" smtClean="0">
+                <a:solidFill>
+                  <a:srgbClr val="0D2192"/>
+                </a:solidFill>
+                <a:latin typeface="Roboto Slab" panose="020B0604020202020204" charset="0"/>
+                <a:ea typeface="Roboto Slab" panose="020B0604020202020204" charset="0"/>
+              </a:rPr>
+              <a:t> </a:t>
+            </a:r>
+            <a:r>
+              <a:rPr lang="en-US" dirty="0" err="1" smtClean="0">
+                <a:solidFill>
+                  <a:srgbClr val="0D2192"/>
+                </a:solidFill>
+                <a:latin typeface="Roboto Slab" panose="020B0604020202020204" charset="0"/>
+                <a:ea typeface="Roboto Slab" panose="020B0604020202020204" charset="0"/>
+              </a:rPr>
+              <a:t>koji</a:t>
+            </a:r>
+            <a:r>
+              <a:rPr lang="en-US" dirty="0" smtClean="0">
+                <a:solidFill>
+                  <a:srgbClr val="0D2192"/>
+                </a:solidFill>
+                <a:latin typeface="Roboto Slab" panose="020B0604020202020204" charset="0"/>
+                <a:ea typeface="Roboto Slab" panose="020B0604020202020204" charset="0"/>
+              </a:rPr>
+              <a:t> </a:t>
+            </a:r>
+            <a:r>
+              <a:rPr lang="en-US" dirty="0" err="1" smtClean="0">
+                <a:solidFill>
+                  <a:srgbClr val="0D2192"/>
+                </a:solidFill>
+                <a:latin typeface="Roboto Slab" panose="020B0604020202020204" charset="0"/>
+                <a:ea typeface="Roboto Slab" panose="020B0604020202020204" charset="0"/>
+              </a:rPr>
+              <a:t>opisuju</a:t>
+            </a:r>
+            <a:r>
+              <a:rPr lang="en-US" dirty="0">
+                <a:solidFill>
+                  <a:srgbClr val="0D2192"/>
+                </a:solidFill>
+                <a:latin typeface="Roboto Slab" panose="020B0604020202020204" charset="0"/>
+                <a:ea typeface="Roboto Slab" panose="020B0604020202020204" charset="0"/>
+              </a:rPr>
+              <a:t> </a:t>
+            </a:r>
+            <a:r>
+              <a:rPr lang="en-US" dirty="0" err="1" smtClean="0">
+                <a:solidFill>
+                  <a:srgbClr val="0D2192"/>
+                </a:solidFill>
+                <a:latin typeface="Roboto Slab" panose="020B0604020202020204" charset="0"/>
+                <a:ea typeface="Roboto Slab" panose="020B0604020202020204" charset="0"/>
+              </a:rPr>
+              <a:t>zahteve</a:t>
+            </a:r>
+            <a:r>
+              <a:rPr lang="en-US" dirty="0" smtClean="0">
+                <a:solidFill>
+                  <a:srgbClr val="0D2192"/>
+                </a:solidFill>
+                <a:latin typeface="Roboto Slab" panose="020B0604020202020204" charset="0"/>
+                <a:ea typeface="Roboto Slab" panose="020B0604020202020204" charset="0"/>
+              </a:rPr>
+              <a:t> </a:t>
+            </a:r>
+            <a:r>
+              <a:rPr lang="en-US" dirty="0" err="1" smtClean="0">
+                <a:solidFill>
+                  <a:srgbClr val="0D2192"/>
+                </a:solidFill>
+                <a:latin typeface="Roboto Slab" panose="020B0604020202020204" charset="0"/>
+                <a:ea typeface="Roboto Slab" panose="020B0604020202020204" charset="0"/>
+              </a:rPr>
+              <a:t>konkurentnosti</a:t>
+            </a:r>
+            <a:r>
+              <a:rPr lang="en-US" dirty="0" smtClean="0">
+                <a:solidFill>
+                  <a:srgbClr val="0D2192"/>
+                </a:solidFill>
+                <a:latin typeface="Roboto Slab" panose="020B0604020202020204" charset="0"/>
+                <a:ea typeface="Roboto Slab" panose="020B0604020202020204" charset="0"/>
+              </a:rPr>
+              <a:t> I </a:t>
+            </a:r>
+            <a:r>
+              <a:rPr lang="en-US" dirty="0" err="1" smtClean="0">
+                <a:solidFill>
+                  <a:srgbClr val="0D2192"/>
+                </a:solidFill>
+                <a:latin typeface="Roboto Slab" panose="020B0604020202020204" charset="0"/>
+                <a:ea typeface="Roboto Slab" panose="020B0604020202020204" charset="0"/>
+              </a:rPr>
+              <a:t>konzistentnosti</a:t>
+            </a:r>
+            <a:endParaRPr lang="en-US" dirty="0" smtClean="0">
+              <a:solidFill>
+                <a:srgbClr val="0D2192"/>
+              </a:solidFill>
+              <a:latin typeface="Roboto Slab" panose="020B0604020202020204" charset="0"/>
+              <a:ea typeface="Roboto Slab" panose="020B0604020202020204" charset="0"/>
+            </a:endParaRPr>
+          </a:p>
+          <a:p>
+            <a:pPr marL="285750" indent="-285750">
+              <a:buFont typeface="Arial" panose="020B0604020202020204" pitchFamily="34" charset="0"/>
+              <a:buChar char="•"/>
+            </a:pPr>
+            <a:r>
+              <a:rPr lang="en-US" dirty="0" smtClean="0">
+                <a:solidFill>
+                  <a:srgbClr val="0D2192"/>
+                </a:solidFill>
+                <a:latin typeface="Roboto Slab" panose="020B0604020202020204" charset="0"/>
+                <a:ea typeface="Roboto Slab" panose="020B0604020202020204" charset="0"/>
+              </a:rPr>
+              <a:t>Po default-u: </a:t>
+            </a:r>
+            <a:r>
+              <a:rPr lang="en-US" b="1" dirty="0" smtClean="0">
+                <a:solidFill>
+                  <a:srgbClr val="0D2192"/>
+                </a:solidFill>
+                <a:latin typeface="Roboto Slab" panose="020B0604020202020204" charset="0"/>
+                <a:ea typeface="Roboto Slab" panose="020B0604020202020204" charset="0"/>
+              </a:rPr>
+              <a:t>eventually consistent </a:t>
+            </a:r>
+            <a:r>
+              <a:rPr lang="en-US" dirty="0" err="1" smtClean="0">
+                <a:solidFill>
+                  <a:srgbClr val="0D2192"/>
+                </a:solidFill>
+                <a:latin typeface="Roboto Slab" panose="020B0604020202020204" charset="0"/>
+                <a:ea typeface="Roboto Slab" panose="020B0604020202020204" charset="0"/>
+              </a:rPr>
+              <a:t>i</a:t>
+            </a:r>
+            <a:r>
+              <a:rPr lang="en-US" dirty="0" smtClean="0">
+                <a:solidFill>
+                  <a:srgbClr val="0D2192"/>
+                </a:solidFill>
+                <a:latin typeface="Roboto Slab" panose="020B0604020202020204" charset="0"/>
+                <a:ea typeface="Roboto Slab" panose="020B0604020202020204" charset="0"/>
+              </a:rPr>
+              <a:t> </a:t>
+            </a:r>
+            <a:r>
+              <a:rPr lang="en-US" b="1" dirty="0" smtClean="0">
+                <a:solidFill>
+                  <a:srgbClr val="0D2192"/>
+                </a:solidFill>
+                <a:latin typeface="Roboto Slab" panose="020B0604020202020204" charset="0"/>
+                <a:ea typeface="Roboto Slab" panose="020B0604020202020204" charset="0"/>
+              </a:rPr>
+              <a:t>last-write-wins</a:t>
+            </a:r>
+          </a:p>
+          <a:p>
+            <a:pPr marL="285750" indent="-285750">
+              <a:buFont typeface="Arial" panose="020B0604020202020204" pitchFamily="34" charset="0"/>
+              <a:buChar char="•"/>
+            </a:pPr>
+            <a:r>
+              <a:rPr lang="en-US" dirty="0" err="1" smtClean="0">
+                <a:solidFill>
+                  <a:srgbClr val="0D2192"/>
+                </a:solidFill>
+                <a:latin typeface="Roboto Slab" panose="020B0604020202020204" charset="0"/>
+                <a:ea typeface="Roboto Slab" panose="020B0604020202020204" charset="0"/>
+              </a:rPr>
+              <a:t>Podr</a:t>
+            </a:r>
+            <a:r>
+              <a:rPr lang="sr-Latn-RS" dirty="0" smtClean="0">
+                <a:solidFill>
+                  <a:srgbClr val="0D2192"/>
+                </a:solidFill>
+                <a:latin typeface="Roboto Slab" panose="020B0604020202020204" charset="0"/>
+                <a:ea typeface="Roboto Slab" panose="020B0604020202020204" charset="0"/>
+              </a:rPr>
+              <a:t>žane </a:t>
+            </a:r>
+            <a:r>
+              <a:rPr lang="sr-Latn-RS" b="1" dirty="0" smtClean="0">
+                <a:solidFill>
+                  <a:srgbClr val="0D2192"/>
+                </a:solidFill>
+                <a:latin typeface="Roboto Slab" panose="020B0604020202020204" charset="0"/>
+                <a:ea typeface="Roboto Slab" panose="020B0604020202020204" charset="0"/>
+              </a:rPr>
+              <a:t>bulk </a:t>
+            </a:r>
+            <a:r>
+              <a:rPr lang="sr-Latn-RS" dirty="0" smtClean="0">
+                <a:solidFill>
+                  <a:srgbClr val="0D2192"/>
+                </a:solidFill>
+                <a:latin typeface="Roboto Slab" panose="020B0604020202020204" charset="0"/>
+                <a:ea typeface="Roboto Slab" panose="020B0604020202020204" charset="0"/>
+              </a:rPr>
+              <a:t>i </a:t>
+            </a:r>
+            <a:r>
+              <a:rPr lang="sr-Latn-RS" b="1" dirty="0" smtClean="0">
+                <a:solidFill>
+                  <a:srgbClr val="0D2192"/>
+                </a:solidFill>
+                <a:latin typeface="Roboto Slab" panose="020B0604020202020204" charset="0"/>
+                <a:ea typeface="Roboto Slab" panose="020B0604020202020204" charset="0"/>
+              </a:rPr>
+              <a:t>transakcione </a:t>
+            </a:r>
+            <a:r>
+              <a:rPr lang="sr-Latn-RS" dirty="0" smtClean="0">
+                <a:solidFill>
+                  <a:srgbClr val="0D2192"/>
+                </a:solidFill>
+                <a:latin typeface="Roboto Slab" panose="020B0604020202020204" charset="0"/>
+                <a:ea typeface="Roboto Slab" panose="020B0604020202020204" charset="0"/>
+              </a:rPr>
+              <a:t>operacije</a:t>
+            </a:r>
+            <a:endParaRPr lang="en-US" dirty="0">
+              <a:solidFill>
+                <a:srgbClr val="0D2192"/>
+              </a:solidFill>
+              <a:latin typeface="Roboto Slab" panose="020B0604020202020204" charset="0"/>
+              <a:ea typeface="Roboto Slab" panose="020B0604020202020204" charset="0"/>
+            </a:endParaRPr>
+          </a:p>
+        </p:txBody>
+      </p:sp>
+      <p:pic>
+        <p:nvPicPr>
+          <p:cNvPr id="12" name="Picture 11"/>
+          <p:cNvPicPr>
+            <a:picLocks noChangeAspect="1"/>
+          </p:cNvPicPr>
+          <p:nvPr/>
+        </p:nvPicPr>
+        <p:blipFill>
+          <a:blip r:embed="rId3"/>
+          <a:stretch>
+            <a:fillRect/>
+          </a:stretch>
+        </p:blipFill>
+        <p:spPr>
+          <a:xfrm>
+            <a:off x="744107" y="3263141"/>
+            <a:ext cx="7581900" cy="409575"/>
+          </a:xfrm>
+          <a:prstGeom prst="rect">
+            <a:avLst/>
+          </a:prstGeom>
+        </p:spPr>
+      </p:pic>
+      <p:sp>
+        <p:nvSpPr>
+          <p:cNvPr id="14" name="Rectangle 13"/>
+          <p:cNvSpPr/>
+          <p:nvPr/>
+        </p:nvSpPr>
+        <p:spPr>
+          <a:xfrm>
+            <a:off x="564120" y="2465154"/>
+            <a:ext cx="4572000" cy="523220"/>
+          </a:xfrm>
+          <a:prstGeom prst="rect">
+            <a:avLst/>
+          </a:prstGeom>
+        </p:spPr>
+        <p:txBody>
+          <a:bodyPr>
+            <a:spAutoFit/>
+          </a:bodyPr>
+          <a:lstStyle/>
+          <a:p>
+            <a:pPr marL="285750" indent="-285750">
+              <a:buFont typeface="Arial" panose="020B0604020202020204" pitchFamily="34" charset="0"/>
+              <a:buChar char="•"/>
+            </a:pPr>
+            <a:r>
+              <a:rPr lang="sr-Latn-RS" dirty="0">
+                <a:solidFill>
+                  <a:srgbClr val="0D2192"/>
+                </a:solidFill>
+                <a:latin typeface="Roboto Slab" panose="020B0604020202020204" charset="0"/>
+                <a:ea typeface="Roboto Slab" panose="020B0604020202020204" charset="0"/>
+              </a:rPr>
+              <a:t>Primena kod Camera Data Calculation service, izrađenog u .Net-u</a:t>
+            </a:r>
+          </a:p>
+        </p:txBody>
+      </p:sp>
+      <p:pic>
+        <p:nvPicPr>
+          <p:cNvPr id="15" name="Picture 14"/>
+          <p:cNvPicPr>
+            <a:picLocks noChangeAspect="1"/>
+          </p:cNvPicPr>
+          <p:nvPr/>
+        </p:nvPicPr>
+        <p:blipFill>
+          <a:blip r:embed="rId4"/>
+          <a:stretch>
+            <a:fillRect/>
+          </a:stretch>
+        </p:blipFill>
+        <p:spPr>
+          <a:xfrm>
+            <a:off x="1334574" y="3904642"/>
+            <a:ext cx="5781675" cy="466725"/>
+          </a:xfrm>
+          <a:prstGeom prst="rect">
+            <a:avLst/>
+          </a:prstGeom>
+        </p:spPr>
+      </p:pic>
+    </p:spTree>
+    <p:extLst>
+      <p:ext uri="{BB962C8B-B14F-4D97-AF65-F5344CB8AC3E}">
+        <p14:creationId xmlns:p14="http://schemas.microsoft.com/office/powerpoint/2010/main" val="3837750589"/>
+      </p:ext>
+    </p:extLst>
+  </p:cSld>
+  <p:clrMapOvr>
+    <a:masterClrMapping/>
+  </p:clrMapOvr>
+  <p:timing>
+    <p:tnLst>
+      <p:par>
+        <p:cTn id="1" dur="indefinite" restart="never" nodeType="tmRoot"/>
+      </p:par>
+    </p:tnLst>
+  </p:timing>
+</p:sld>
+</file>
+
+<file path=ppt/slides/slide22.xml><?xml version="1.0" encoding="utf-8"?>
+<p:sld xmlns:a="http://schemas.openxmlformats.org/drawingml/2006/main" xmlns:r="http://schemas.openxmlformats.org/officeDocument/2006/relationships" xmlns:p="http://schemas.openxmlformats.org/presentationml/2006/main">
+  <p:cSld>
+    <p:spTree>
+      <p:nvGrpSpPr>
+        <p:cNvPr id="1" name=""/>
+        <p:cNvGrpSpPr/>
+        <p:nvPr/>
+      </p:nvGrpSpPr>
+      <p:grpSpPr>
+        <a:xfrm>
+          <a:off x="0" y="0"/>
+          <a:ext cx="0" cy="0"/>
+          <a:chOff x="0" y="0"/>
+          <a:chExt cx="0" cy="0"/>
+        </a:xfrm>
+      </p:grpSpPr>
+      <p:sp>
+        <p:nvSpPr>
+          <p:cNvPr id="2" name="Title 1"/>
+          <p:cNvSpPr>
+            <a:spLocks noGrp="1"/>
+          </p:cNvSpPr>
+          <p:nvPr>
+            <p:ph type="title"/>
+          </p:nvPr>
+        </p:nvSpPr>
+        <p:spPr/>
+        <p:txBody>
+          <a:bodyPr/>
+          <a:lstStyle/>
+          <a:p>
+            <a:r>
+              <a:rPr lang="en-US" dirty="0" smtClean="0">
+                <a:solidFill>
+                  <a:srgbClr val="0D2192"/>
+                </a:solidFill>
+                <a:latin typeface="Roboto Slab" panose="020B0604020202020204" charset="0"/>
+                <a:ea typeface="Roboto Slab" panose="020B0604020202020204" charset="0"/>
+              </a:rPr>
+              <a:t>Publish</a:t>
+            </a:r>
+            <a:r>
+              <a:rPr lang="sr-Latn-RS" dirty="0">
+                <a:solidFill>
+                  <a:srgbClr val="0D2192"/>
+                </a:solidFill>
+                <a:latin typeface="Roboto Slab" panose="020B0604020202020204" charset="0"/>
+                <a:ea typeface="Roboto Slab" panose="020B0604020202020204" charset="0"/>
+              </a:rPr>
+              <a:t> </a:t>
+            </a:r>
+            <a:r>
+              <a:rPr lang="sr-Latn-RS" dirty="0" smtClean="0">
+                <a:solidFill>
+                  <a:srgbClr val="0D2192"/>
+                </a:solidFill>
+                <a:latin typeface="Roboto Slab" panose="020B0604020202020204" charset="0"/>
+                <a:ea typeface="Roboto Slab" panose="020B0604020202020204" charset="0"/>
+              </a:rPr>
+              <a:t>&amp; </a:t>
+            </a:r>
+            <a:r>
+              <a:rPr lang="en-US" dirty="0" smtClean="0">
+                <a:solidFill>
+                  <a:srgbClr val="0D2192"/>
+                </a:solidFill>
+                <a:latin typeface="Roboto Slab" panose="020B0604020202020204" charset="0"/>
+                <a:ea typeface="Roboto Slab" panose="020B0604020202020204" charset="0"/>
+              </a:rPr>
+              <a:t>Subscribe</a:t>
+            </a:r>
+            <a:endParaRPr lang="sr-Latn-RS" dirty="0">
+              <a:solidFill>
+                <a:srgbClr val="0D2192"/>
+              </a:solidFill>
+              <a:latin typeface="Roboto Slab" panose="020B0604020202020204" charset="0"/>
+              <a:ea typeface="Roboto Slab" panose="020B0604020202020204" charset="0"/>
+            </a:endParaRPr>
+          </a:p>
+        </p:txBody>
+      </p:sp>
+      <p:sp>
+        <p:nvSpPr>
+          <p:cNvPr id="5" name="Slide Number Placeholder 4"/>
+          <p:cNvSpPr>
+            <a:spLocks noGrp="1"/>
+          </p:cNvSpPr>
+          <p:nvPr>
+            <p:ph type="sldNum" idx="12"/>
+          </p:nvPr>
+        </p:nvSpPr>
+        <p:spPr/>
+        <p:txBody>
+          <a:bodyPr/>
+          <a:lstStyle/>
+          <a:p>
+            <a:pPr marL="0" lvl="0" indent="0" algn="r" rtl="0">
+              <a:spcBef>
+                <a:spcPts val="0"/>
+              </a:spcBef>
+              <a:spcAft>
+                <a:spcPts val="0"/>
+              </a:spcAft>
+              <a:buNone/>
+            </a:pPr>
+            <a:fld id="{00000000-1234-1234-1234-123412341234}" type="slidenum">
+              <a:rPr lang="en" smtClean="0"/>
+              <a:t>22</a:t>
+            </a:fld>
+            <a:endParaRPr lang="en"/>
+          </a:p>
+        </p:txBody>
+      </p:sp>
+      <p:sp>
+        <p:nvSpPr>
+          <p:cNvPr id="6" name="TextBox 5"/>
+          <p:cNvSpPr txBox="1"/>
+          <p:nvPr/>
+        </p:nvSpPr>
+        <p:spPr>
+          <a:xfrm>
+            <a:off x="598992" y="1240589"/>
+            <a:ext cx="3694945" cy="3108543"/>
+          </a:xfrm>
+          <a:prstGeom prst="rect">
+            <a:avLst/>
+          </a:prstGeom>
+          <a:noFill/>
+        </p:spPr>
+        <p:txBody>
+          <a:bodyPr wrap="square" rtlCol="0">
+            <a:spAutoFit/>
+          </a:bodyPr>
+          <a:lstStyle/>
+          <a:p>
+            <a:pPr marL="285750" indent="-285750">
+              <a:buFont typeface="Arial" panose="020B0604020202020204" pitchFamily="34" charset="0"/>
+              <a:buChar char="•"/>
+            </a:pPr>
+            <a:r>
+              <a:rPr lang="sr-Latn-RS" dirty="0" smtClean="0">
+                <a:solidFill>
+                  <a:srgbClr val="0D2192"/>
+                </a:solidFill>
+                <a:latin typeface="Roboto Slab" panose="020B0604020202020204" charset="0"/>
+                <a:ea typeface="Roboto Slab" panose="020B0604020202020204" charset="0"/>
+              </a:rPr>
+              <a:t>Objaviljivač (publisher) šalje poruke preko ulaznog kanala, na određenu temu </a:t>
+            </a:r>
+            <a:r>
+              <a:rPr lang="sr-Latn-RS" b="1" dirty="0" smtClean="0">
+                <a:solidFill>
+                  <a:srgbClr val="0D2192"/>
+                </a:solidFill>
+                <a:latin typeface="Roboto Slab" panose="020B0604020202020204" charset="0"/>
+                <a:ea typeface="Roboto Slab" panose="020B0604020202020204" charset="0"/>
+              </a:rPr>
+              <a:t>(topic)</a:t>
+            </a:r>
+          </a:p>
+          <a:p>
+            <a:pPr marL="285750" indent="-285750">
+              <a:buFont typeface="Arial" panose="020B0604020202020204" pitchFamily="34" charset="0"/>
+              <a:buChar char="•"/>
+            </a:pPr>
+            <a:r>
+              <a:rPr lang="sr-Latn-RS" dirty="0" smtClean="0">
+                <a:solidFill>
+                  <a:srgbClr val="0D2192"/>
+                </a:solidFill>
+                <a:latin typeface="Roboto Slab" panose="020B0604020202020204" charset="0"/>
+                <a:ea typeface="Roboto Slab" panose="020B0604020202020204" charset="0"/>
+              </a:rPr>
+              <a:t>Pretplatnik (subscriber) se pretplaćuje na temu i prima poruke sa izlaznog kanala</a:t>
+            </a:r>
+          </a:p>
+          <a:p>
+            <a:pPr marL="285750" indent="-285750">
+              <a:buFont typeface="Arial" panose="020B0604020202020204" pitchFamily="34" charset="0"/>
+              <a:buChar char="•"/>
+            </a:pPr>
+            <a:r>
+              <a:rPr lang="sr-Latn-RS" dirty="0" smtClean="0">
+                <a:solidFill>
+                  <a:srgbClr val="0D2192"/>
+                </a:solidFill>
+                <a:latin typeface="Roboto Slab" panose="020B0604020202020204" charset="0"/>
+                <a:ea typeface="Roboto Slab" panose="020B0604020202020204" charset="0"/>
+              </a:rPr>
+              <a:t>Queueing mehanizam message brocker-a, garantuje trajnost, čuvanjem poruka</a:t>
+            </a:r>
+          </a:p>
+          <a:p>
+            <a:pPr marL="285750" indent="-285750">
+              <a:buFont typeface="Arial" panose="020B0604020202020204" pitchFamily="34" charset="0"/>
+              <a:buChar char="•"/>
+            </a:pPr>
+            <a:r>
+              <a:rPr lang="sr-Latn-RS" dirty="0" smtClean="0">
+                <a:solidFill>
+                  <a:srgbClr val="0D2192"/>
+                </a:solidFill>
+                <a:latin typeface="Roboto Slab" panose="020B0604020202020204" charset="0"/>
+                <a:ea typeface="Roboto Slab" panose="020B0604020202020204" charset="0"/>
+              </a:rPr>
+              <a:t>Pretplatnici ne moraju biti odmah dostupni</a:t>
+            </a:r>
+          </a:p>
+          <a:p>
+            <a:pPr marL="285750" indent="-285750">
+              <a:buFont typeface="Arial" panose="020B0604020202020204" pitchFamily="34" charset="0"/>
+              <a:buChar char="•"/>
+            </a:pPr>
+            <a:r>
+              <a:rPr lang="sr-Latn-RS" dirty="0" smtClean="0">
+                <a:solidFill>
+                  <a:srgbClr val="0D2192"/>
+                </a:solidFill>
+                <a:latin typeface="Roboto Slab" panose="020B0604020202020204" charset="0"/>
+                <a:ea typeface="Roboto Slab" panose="020B0604020202020204" charset="0"/>
+              </a:rPr>
+              <a:t>DAPR garantuje At-Least-Once semantiku</a:t>
+            </a:r>
+          </a:p>
+          <a:p>
+            <a:pPr marL="285750" indent="-285750">
+              <a:buFont typeface="Arial" panose="020B0604020202020204" pitchFamily="34" charset="0"/>
+              <a:buChar char="•"/>
+            </a:pPr>
+            <a:endParaRPr lang="sr-Latn-RS" dirty="0">
+              <a:solidFill>
+                <a:srgbClr val="0D2192"/>
+              </a:solidFill>
+              <a:latin typeface="Roboto Slab" panose="020B0604020202020204" charset="0"/>
+              <a:ea typeface="Roboto Slab" panose="020B0604020202020204" charset="0"/>
+            </a:endParaRPr>
+          </a:p>
+        </p:txBody>
+      </p:sp>
+      <p:pic>
+        <p:nvPicPr>
+          <p:cNvPr id="3080" name="Picture 8" descr="https://docs.dapr.io/images/pubsub-overview-pattern.png"/>
+          <p:cNvPicPr>
+            <a:picLocks noChangeAspect="1" noChangeArrowheads="1"/>
+          </p:cNvPicPr>
+          <p:nvPr/>
+        </p:nvPicPr>
+        <p:blipFill>
+          <a:blip r:embed="rId2">
+            <a:extLst>
+              <a:ext uri="{28A0092B-C50C-407E-A947-70E740481C1C}">
+                <a14:useLocalDpi xmlns:a14="http://schemas.microsoft.com/office/drawing/2010/main" val="0"/>
+              </a:ext>
+            </a:extLst>
+          </a:blip>
+          <a:srcRect/>
+          <a:stretch>
+            <a:fillRect/>
+          </a:stretch>
+        </p:blipFill>
+        <p:spPr bwMode="auto">
+          <a:xfrm>
+            <a:off x="4646864" y="1527373"/>
+            <a:ext cx="4256004" cy="1665005"/>
+          </a:xfrm>
+          <a:prstGeom prst="rect">
+            <a:avLst/>
+          </a:prstGeom>
+          <a:noFill/>
+          <a:extLst>
+            <a:ext uri="{909E8E84-426E-40DD-AFC4-6F175D3DCCD1}">
+              <a14:hiddenFill xmlns:a14="http://schemas.microsoft.com/office/drawing/2010/main">
+                <a:solidFill>
+                  <a:srgbClr val="FFFFFF"/>
+                </a:solidFill>
+              </a14:hiddenFill>
+            </a:ext>
+          </a:extLst>
+        </p:spPr>
+      </p:pic>
+    </p:spTree>
+    <p:extLst>
+      <p:ext uri="{BB962C8B-B14F-4D97-AF65-F5344CB8AC3E}">
+        <p14:creationId xmlns:p14="http://schemas.microsoft.com/office/powerpoint/2010/main" val="3519485315"/>
+      </p:ext>
+    </p:extLst>
+  </p:cSld>
+  <p:clrMapOvr>
+    <a:masterClrMapping/>
+  </p:clrMapOvr>
+  <p:timing>
+    <p:tnLst>
+      <p:par>
+        <p:cTn id="1" dur="indefinite" restart="never" nodeType="tmRoot"/>
+      </p:par>
+    </p:tnLst>
+  </p:timing>
+</p:sld>
+</file>
+
+<file path=ppt/slides/slide23.xml><?xml version="1.0" encoding="utf-8"?>
+<p:sld xmlns:a="http://schemas.openxmlformats.org/drawingml/2006/main" xmlns:r="http://schemas.openxmlformats.org/officeDocument/2006/relationships" xmlns:p="http://schemas.openxmlformats.org/presentationml/2006/main">
+  <p:cSld>
+    <p:spTree>
+      <p:nvGrpSpPr>
+        <p:cNvPr id="1" name=""/>
+        <p:cNvGrpSpPr/>
+        <p:nvPr/>
+      </p:nvGrpSpPr>
+      <p:grpSpPr>
+        <a:xfrm>
+          <a:off x="0" y="0"/>
+          <a:ext cx="0" cy="0"/>
+          <a:chOff x="0" y="0"/>
+          <a:chExt cx="0" cy="0"/>
+        </a:xfrm>
+      </p:grpSpPr>
+      <p:sp>
+        <p:nvSpPr>
+          <p:cNvPr id="5" name="Slide Number Placeholder 4"/>
+          <p:cNvSpPr>
+            <a:spLocks noGrp="1"/>
+          </p:cNvSpPr>
+          <p:nvPr>
+            <p:ph type="sldNum" idx="12"/>
+          </p:nvPr>
+        </p:nvSpPr>
+        <p:spPr/>
+        <p:txBody>
+          <a:bodyPr/>
+          <a:lstStyle/>
+          <a:p>
+            <a:pPr marL="0" lvl="0" indent="0" algn="r" rtl="0">
+              <a:spcBef>
+                <a:spcPts val="0"/>
+              </a:spcBef>
+              <a:spcAft>
+                <a:spcPts val="0"/>
+              </a:spcAft>
+              <a:buNone/>
+            </a:pPr>
+            <a:fld id="{00000000-1234-1234-1234-123412341234}" type="slidenum">
+              <a:rPr lang="en" smtClean="0"/>
+              <a:t>23</a:t>
             </a:fld>
             <a:endParaRPr lang="en"/>
           </a:p>
@@ -6982,7 +7591,7 @@
 </p:sld>
 </file>
 
-<file path=ppt/slides/slide22.xml><?xml version="1.0" encoding="utf-8"?>
+<file path=ppt/slides/slide24.xml><?xml version="1.0" encoding="utf-8"?>
 <p:sld xmlns:a="http://schemas.openxmlformats.org/drawingml/2006/main" xmlns:r="http://schemas.openxmlformats.org/officeDocument/2006/relationships" xmlns:p="http://schemas.openxmlformats.org/presentationml/2006/main">
   <p:cSld>
     <p:spTree>
@@ -7065,7 +7674,7 @@
             </a:pPr>
             <a:fld id="{00000000-1234-1234-1234-123412341234}" type="slidenum">
               <a:rPr lang="en" smtClean="0"/>
-              <a:t>22</a:t>
+              <a:t>24</a:t>
             </a:fld>
             <a:endParaRPr lang="en"/>
           </a:p>
@@ -8858,6 +9467,13 @@
   <p:clrMapOvr>
     <a:masterClrMapping/>
   </p:clrMapOvr>
+  <p:timing>
+    <p:tnLst>
+      <p:par>
+        <p:cTn id="1" dur="indefinite" restart="never" nodeType="tmRoot"/>
+      </p:par>
+    </p:tnLst>
+  </p:timing>
 </p:sld>
 </file>
 

</xml_diff>